<commit_message>
adds to sbl talk.
</commit_message>
<xml_diff>
--- a/SBL_talk/sbl_presentation_revised.pptx
+++ b/SBL_talk/sbl_presentation_revised.pptx
@@ -7,8 +7,8 @@
   <p:sldIdLst>
     <p:sldId id="327" r:id="rId2"/>
     <p:sldId id="277" r:id="rId3"/>
-    <p:sldId id="284" r:id="rId4"/>
-    <p:sldId id="285" r:id="rId5"/>
+    <p:sldId id="329" r:id="rId4"/>
+    <p:sldId id="284" r:id="rId5"/>
     <p:sldId id="278" r:id="rId6"/>
     <p:sldId id="282" r:id="rId7"/>
     <p:sldId id="279" r:id="rId8"/>
@@ -326,7 +326,7 @@
           <a:p>
             <a:fld id="{AB94029E-6FCD-4D3D-AE41-24E942A5DE05}" type="datetimeFigureOut">
               <a:rPr lang="en-US" smtClean="0"/>
-              <a:t>11/18/2015</a:t>
+              <a:t>11/19/2015</a:t>
             </a:fld>
             <a:endParaRPr lang="en-US"/>
           </a:p>
@@ -496,7 +496,7 @@
           <a:p>
             <a:fld id="{AB94029E-6FCD-4D3D-AE41-24E942A5DE05}" type="datetimeFigureOut">
               <a:rPr lang="en-US" smtClean="0"/>
-              <a:t>11/18/2015</a:t>
+              <a:t>11/19/2015</a:t>
             </a:fld>
             <a:endParaRPr lang="en-US"/>
           </a:p>
@@ -676,7 +676,7 @@
           <a:p>
             <a:fld id="{AB94029E-6FCD-4D3D-AE41-24E942A5DE05}" type="datetimeFigureOut">
               <a:rPr lang="en-US" smtClean="0"/>
-              <a:t>11/18/2015</a:t>
+              <a:t>11/19/2015</a:t>
             </a:fld>
             <a:endParaRPr lang="en-US"/>
           </a:p>
@@ -846,7 +846,7 @@
           <a:p>
             <a:fld id="{AB94029E-6FCD-4D3D-AE41-24E942A5DE05}" type="datetimeFigureOut">
               <a:rPr lang="en-US" smtClean="0"/>
-              <a:t>11/18/2015</a:t>
+              <a:t>11/19/2015</a:t>
             </a:fld>
             <a:endParaRPr lang="en-US"/>
           </a:p>
@@ -1092,7 +1092,7 @@
           <a:p>
             <a:fld id="{AB94029E-6FCD-4D3D-AE41-24E942A5DE05}" type="datetimeFigureOut">
               <a:rPr lang="en-US" smtClean="0"/>
-              <a:t>11/18/2015</a:t>
+              <a:t>11/19/2015</a:t>
             </a:fld>
             <a:endParaRPr lang="en-US"/>
           </a:p>
@@ -1380,7 +1380,7 @@
           <a:p>
             <a:fld id="{AB94029E-6FCD-4D3D-AE41-24E942A5DE05}" type="datetimeFigureOut">
               <a:rPr lang="en-US" smtClean="0"/>
-              <a:t>11/18/2015</a:t>
+              <a:t>11/19/2015</a:t>
             </a:fld>
             <a:endParaRPr lang="en-US"/>
           </a:p>
@@ -1802,7 +1802,7 @@
           <a:p>
             <a:fld id="{AB94029E-6FCD-4D3D-AE41-24E942A5DE05}" type="datetimeFigureOut">
               <a:rPr lang="en-US" smtClean="0"/>
-              <a:t>11/18/2015</a:t>
+              <a:t>11/19/2015</a:t>
             </a:fld>
             <a:endParaRPr lang="en-US"/>
           </a:p>
@@ -1920,7 +1920,7 @@
           <a:p>
             <a:fld id="{AB94029E-6FCD-4D3D-AE41-24E942A5DE05}" type="datetimeFigureOut">
               <a:rPr lang="en-US" smtClean="0"/>
-              <a:t>11/18/2015</a:t>
+              <a:t>11/19/2015</a:t>
             </a:fld>
             <a:endParaRPr lang="en-US"/>
           </a:p>
@@ -2015,7 +2015,7 @@
           <a:p>
             <a:fld id="{AB94029E-6FCD-4D3D-AE41-24E942A5DE05}" type="datetimeFigureOut">
               <a:rPr lang="en-US" smtClean="0"/>
-              <a:t>11/18/2015</a:t>
+              <a:t>11/19/2015</a:t>
             </a:fld>
             <a:endParaRPr lang="en-US"/>
           </a:p>
@@ -2292,7 +2292,7 @@
           <a:p>
             <a:fld id="{AB94029E-6FCD-4D3D-AE41-24E942A5DE05}" type="datetimeFigureOut">
               <a:rPr lang="en-US" smtClean="0"/>
-              <a:t>11/18/2015</a:t>
+              <a:t>11/19/2015</a:t>
             </a:fld>
             <a:endParaRPr lang="en-US"/>
           </a:p>
@@ -2545,7 +2545,7 @@
           <a:p>
             <a:fld id="{AB94029E-6FCD-4D3D-AE41-24E942A5DE05}" type="datetimeFigureOut">
               <a:rPr lang="en-US" smtClean="0"/>
-              <a:t>11/18/2015</a:t>
+              <a:t>11/19/2015</a:t>
             </a:fld>
             <a:endParaRPr lang="en-US"/>
           </a:p>
@@ -2758,7 +2758,7 @@
           <a:p>
             <a:fld id="{AB94029E-6FCD-4D3D-AE41-24E942A5DE05}" type="datetimeFigureOut">
               <a:rPr lang="en-US" smtClean="0"/>
-              <a:t>11/18/2015</a:t>
+              <a:t>11/19/2015</a:t>
             </a:fld>
             <a:endParaRPr lang="en-US"/>
           </a:p>
@@ -5591,10 +5591,66 @@
           <a:chExt cx="0" cy="0"/>
         </a:xfrm>
       </p:grpSpPr>
+      <p:sp>
+        <p:nvSpPr>
+          <p:cNvPr id="2" name="TextBox 1"/>
+          <p:cNvSpPr txBox="1"/>
+          <p:nvPr/>
+        </p:nvSpPr>
+        <p:spPr>
+          <a:xfrm>
+            <a:off x="1143000" y="914400"/>
+            <a:ext cx="5016886" cy="1754326"/>
+          </a:xfrm>
+          <a:prstGeom prst="rect">
+            <a:avLst/>
+          </a:prstGeom>
+          <a:noFill/>
+        </p:spPr>
+        <p:txBody>
+          <a:bodyPr wrap="none" rtlCol="0">
+            <a:spAutoFit/>
+          </a:bodyPr>
+          <a:lstStyle/>
+          <a:p>
+            <a:r>
+              <a:rPr lang="en-US" sz="3600" dirty="0" smtClean="0"/>
+              <a:t>Arethusa at </a:t>
+            </a:r>
+            <a:r>
+              <a:rPr lang="en-US" sz="3600" dirty="0" err="1" smtClean="0"/>
+              <a:t>Perseids</a:t>
+            </a:r>
+            <a:endParaRPr lang="en-US" sz="3600" dirty="0" smtClean="0"/>
+          </a:p>
+          <a:p>
+            <a:r>
+              <a:rPr lang="en-US" sz="3600" dirty="0">
+                <a:hlinkClick r:id="rId2"/>
+              </a:rPr>
+              <a:t>http://www.perseids.org</a:t>
+            </a:r>
+            <a:r>
+              <a:rPr lang="en-US" sz="3600" dirty="0" smtClean="0">
+                <a:hlinkClick r:id="rId2"/>
+              </a:rPr>
+              <a:t>/</a:t>
+            </a:r>
+            <a:endParaRPr lang="en-US" sz="3600" dirty="0" smtClean="0"/>
+          </a:p>
+          <a:p>
+            <a:r>
+              <a:rPr lang="en-US" sz="3600" dirty="0" smtClean="0"/>
+              <a:t> </a:t>
+            </a:r>
+            <a:endParaRPr lang="en-US" sz="3600" dirty="0"/>
+          </a:p>
+        </p:txBody>
+      </p:sp>
     </p:spTree>
     <p:extLst>
       <p:ext uri="{BB962C8B-B14F-4D97-AF65-F5344CB8AC3E}">
-        <p14:creationId xmlns:p14="http://schemas.microsoft.com/office/powerpoint/2010/main" val="3976027406"/>
+        <p14:creationId xmlns:p14="http://schemas.microsoft.com/office/powerpoint/2010/main" val="3972574902"/>
       </p:ext>
     </p:extLst>
   </p:cSld>
@@ -6798,6 +6854,106 @@
           <a:chExt cx="0" cy="0"/>
         </a:xfrm>
       </p:grpSpPr>
+      <p:sp>
+        <p:nvSpPr>
+          <p:cNvPr id="2" name="TextBox 1"/>
+          <p:cNvSpPr txBox="1"/>
+          <p:nvPr/>
+        </p:nvSpPr>
+        <p:spPr>
+          <a:xfrm>
+            <a:off x="381001" y="1600200"/>
+            <a:ext cx="8153400" cy="1754326"/>
+          </a:xfrm>
+          <a:prstGeom prst="rect">
+            <a:avLst/>
+          </a:prstGeom>
+          <a:noFill/>
+        </p:spPr>
+        <p:txBody>
+          <a:bodyPr wrap="square" rtlCol="0">
+            <a:spAutoFit/>
+          </a:bodyPr>
+          <a:lstStyle/>
+          <a:p>
+            <a:r>
+              <a:rPr lang="en-US" dirty="0" smtClean="0"/>
+              <a:t>After</a:t>
+            </a:r>
+          </a:p>
+          <a:p>
+            <a:pPr marL="285750" indent="-285750">
+              <a:buFont typeface="Arial" panose="020B0604020202020204" pitchFamily="34" charset="0"/>
+              <a:buChar char="•"/>
+            </a:pPr>
+            <a:r>
+              <a:rPr lang="en-US" dirty="0" smtClean="0"/>
+              <a:t>Charles Hollingsworth, “Using Dependency-Based Annotations for Authorship Identification” (2012), introduces “</a:t>
+            </a:r>
+            <a:r>
+              <a:rPr lang="en-US" dirty="0" err="1" smtClean="0"/>
+              <a:t>DepWords</a:t>
+            </a:r>
+            <a:r>
+              <a:rPr lang="en-US" dirty="0" smtClean="0"/>
+              <a:t>”</a:t>
+            </a:r>
+            <a:br>
+              <a:rPr lang="en-US" dirty="0" smtClean="0"/>
+            </a:br>
+            <a:endParaRPr lang="en-US" dirty="0" smtClean="0"/>
+          </a:p>
+          <a:p>
+            <a:pPr marL="285750" indent="-285750">
+              <a:buFont typeface="Arial" panose="020B0604020202020204" pitchFamily="34" charset="0"/>
+              <a:buChar char="•"/>
+            </a:pPr>
+            <a:r>
+              <a:rPr lang="en-US" dirty="0" smtClean="0"/>
+              <a:t>Grigori </a:t>
+            </a:r>
+            <a:r>
+              <a:rPr lang="en-US" dirty="0" err="1" smtClean="0"/>
+              <a:t>Sidorov</a:t>
+            </a:r>
+            <a:r>
+              <a:rPr lang="en-US" dirty="0" smtClean="0"/>
+              <a:t>, “Syntactic Dependency-Based N-grams as Classification Features” (2012),  introduces “Sn-grams” (“syntactic n-grams)</a:t>
+            </a:r>
+            <a:endParaRPr lang="en-US" dirty="0"/>
+          </a:p>
+        </p:txBody>
+      </p:sp>
+      <p:sp>
+        <p:nvSpPr>
+          <p:cNvPr id="3" name="TextBox 2"/>
+          <p:cNvSpPr txBox="1"/>
+          <p:nvPr/>
+        </p:nvSpPr>
+        <p:spPr>
+          <a:xfrm>
+            <a:off x="2819400" y="396017"/>
+            <a:ext cx="2785955" cy="584775"/>
+          </a:xfrm>
+          <a:prstGeom prst="rect">
+            <a:avLst/>
+          </a:prstGeom>
+          <a:noFill/>
+        </p:spPr>
+        <p:txBody>
+          <a:bodyPr wrap="none" rtlCol="0">
+            <a:spAutoFit/>
+          </a:bodyPr>
+          <a:lstStyle/>
+          <a:p>
+            <a:r>
+              <a:rPr lang="en-US" sz="3200" dirty="0" smtClean="0"/>
+              <a:t>“Syntax Words”</a:t>
+            </a:r>
+            <a:endParaRPr lang="en-US" sz="3200" dirty="0"/>
+          </a:p>
+        </p:txBody>
+      </p:sp>
     </p:spTree>
     <p:extLst>
       <p:ext uri="{BB962C8B-B14F-4D97-AF65-F5344CB8AC3E}">

</xml_diff>

<commit_message>
revision of sbl presentation.
</commit_message>
<xml_diff>
--- a/SBL_talk/sbl_presentation_revised.pptx
+++ b/SBL_talk/sbl_presentation_revised.pptx
@@ -43,7 +43,8 @@
     <p:sldId id="320" r:id="rId37"/>
     <p:sldId id="321" r:id="rId38"/>
     <p:sldId id="325" r:id="rId39"/>
-    <p:sldId id="326" r:id="rId40"/>
+    <p:sldId id="330" r:id="rId40"/>
+    <p:sldId id="326" r:id="rId41"/>
   </p:sldIdLst>
   <p:sldSz cx="9144000" cy="6858000" type="screen4x3"/>
   <p:notesSz cx="6858000" cy="9144000"/>
@@ -326,7 +327,7 @@
           <a:p>
             <a:fld id="{AB94029E-6FCD-4D3D-AE41-24E942A5DE05}" type="datetimeFigureOut">
               <a:rPr lang="en-US" smtClean="0"/>
-              <a:t>11/19/2015</a:t>
+              <a:t>11/20/2015</a:t>
             </a:fld>
             <a:endParaRPr lang="en-US"/>
           </a:p>
@@ -496,7 +497,7 @@
           <a:p>
             <a:fld id="{AB94029E-6FCD-4D3D-AE41-24E942A5DE05}" type="datetimeFigureOut">
               <a:rPr lang="en-US" smtClean="0"/>
-              <a:t>11/19/2015</a:t>
+              <a:t>11/20/2015</a:t>
             </a:fld>
             <a:endParaRPr lang="en-US"/>
           </a:p>
@@ -676,7 +677,7 @@
           <a:p>
             <a:fld id="{AB94029E-6FCD-4D3D-AE41-24E942A5DE05}" type="datetimeFigureOut">
               <a:rPr lang="en-US" smtClean="0"/>
-              <a:t>11/19/2015</a:t>
+              <a:t>11/20/2015</a:t>
             </a:fld>
             <a:endParaRPr lang="en-US"/>
           </a:p>
@@ -846,7 +847,7 @@
           <a:p>
             <a:fld id="{AB94029E-6FCD-4D3D-AE41-24E942A5DE05}" type="datetimeFigureOut">
               <a:rPr lang="en-US" smtClean="0"/>
-              <a:t>11/19/2015</a:t>
+              <a:t>11/20/2015</a:t>
             </a:fld>
             <a:endParaRPr lang="en-US"/>
           </a:p>
@@ -1092,7 +1093,7 @@
           <a:p>
             <a:fld id="{AB94029E-6FCD-4D3D-AE41-24E942A5DE05}" type="datetimeFigureOut">
               <a:rPr lang="en-US" smtClean="0"/>
-              <a:t>11/19/2015</a:t>
+              <a:t>11/20/2015</a:t>
             </a:fld>
             <a:endParaRPr lang="en-US"/>
           </a:p>
@@ -1380,7 +1381,7 @@
           <a:p>
             <a:fld id="{AB94029E-6FCD-4D3D-AE41-24E942A5DE05}" type="datetimeFigureOut">
               <a:rPr lang="en-US" smtClean="0"/>
-              <a:t>11/19/2015</a:t>
+              <a:t>11/20/2015</a:t>
             </a:fld>
             <a:endParaRPr lang="en-US"/>
           </a:p>
@@ -1802,7 +1803,7 @@
           <a:p>
             <a:fld id="{AB94029E-6FCD-4D3D-AE41-24E942A5DE05}" type="datetimeFigureOut">
               <a:rPr lang="en-US" smtClean="0"/>
-              <a:t>11/19/2015</a:t>
+              <a:t>11/20/2015</a:t>
             </a:fld>
             <a:endParaRPr lang="en-US"/>
           </a:p>
@@ -1920,7 +1921,7 @@
           <a:p>
             <a:fld id="{AB94029E-6FCD-4D3D-AE41-24E942A5DE05}" type="datetimeFigureOut">
               <a:rPr lang="en-US" smtClean="0"/>
-              <a:t>11/19/2015</a:t>
+              <a:t>11/20/2015</a:t>
             </a:fld>
             <a:endParaRPr lang="en-US"/>
           </a:p>
@@ -2015,7 +2016,7 @@
           <a:p>
             <a:fld id="{AB94029E-6FCD-4D3D-AE41-24E942A5DE05}" type="datetimeFigureOut">
               <a:rPr lang="en-US" smtClean="0"/>
-              <a:t>11/19/2015</a:t>
+              <a:t>11/20/2015</a:t>
             </a:fld>
             <a:endParaRPr lang="en-US"/>
           </a:p>
@@ -2292,7 +2293,7 @@
           <a:p>
             <a:fld id="{AB94029E-6FCD-4D3D-AE41-24E942A5DE05}" type="datetimeFigureOut">
               <a:rPr lang="en-US" smtClean="0"/>
-              <a:t>11/19/2015</a:t>
+              <a:t>11/20/2015</a:t>
             </a:fld>
             <a:endParaRPr lang="en-US"/>
           </a:p>
@@ -2545,7 +2546,7 @@
           <a:p>
             <a:fld id="{AB94029E-6FCD-4D3D-AE41-24E942A5DE05}" type="datetimeFigureOut">
               <a:rPr lang="en-US" smtClean="0"/>
-              <a:t>11/19/2015</a:t>
+              <a:t>11/20/2015</a:t>
             </a:fld>
             <a:endParaRPr lang="en-US"/>
           </a:p>
@@ -2758,7 +2759,7 @@
           <a:p>
             <a:fld id="{AB94029E-6FCD-4D3D-AE41-24E942A5DE05}" type="datetimeFigureOut">
               <a:rPr lang="en-US" smtClean="0"/>
-              <a:t>11/19/2015</a:t>
+              <a:t>11/20/2015</a:t>
             </a:fld>
             <a:endParaRPr lang="en-US"/>
           </a:p>
@@ -6794,6 +6795,119 @@
           <a:chExt cx="0" cy="0"/>
         </a:xfrm>
       </p:grpSpPr>
+      <p:sp>
+        <p:nvSpPr>
+          <p:cNvPr id="3" name="Rectangle 2"/>
+          <p:cNvSpPr/>
+          <p:nvPr/>
+        </p:nvSpPr>
+        <p:spPr>
+          <a:xfrm>
+            <a:off x="2819400" y="685800"/>
+            <a:ext cx="3027111" cy="646331"/>
+          </a:xfrm>
+          <a:prstGeom prst="rect">
+            <a:avLst/>
+          </a:prstGeom>
+        </p:spPr>
+        <p:txBody>
+          <a:bodyPr wrap="none">
+            <a:spAutoFit/>
+          </a:bodyPr>
+          <a:lstStyle/>
+          <a:p>
+            <a:r>
+              <a:rPr lang="en-US" dirty="0"/>
+              <a:t>#-</a:t>
+            </a:r>
+            <a:r>
+              <a:rPr lang="en-US" sz="3600" dirty="0" err="1"/>
+              <a:t>pred</a:t>
+            </a:r>
+            <a:r>
+              <a:rPr lang="en-US" sz="3600" dirty="0"/>
+              <a:t>*sub*sub</a:t>
+            </a:r>
+          </a:p>
+        </p:txBody>
+      </p:sp>
+      <p:pic>
+        <p:nvPicPr>
+          <p:cNvPr id="1025" name="Picture 1" descr="C:\Users\bgorman\AppData\Local\Skitch\Screenshot_112015_100407_PM.jpg"/>
+          <p:cNvPicPr>
+            <a:picLocks noChangeAspect="1" noChangeArrowheads="1"/>
+          </p:cNvPicPr>
+          <p:nvPr/>
+        </p:nvPicPr>
+        <p:blipFill>
+          <a:blip r:embed="rId2">
+            <a:extLst>
+              <a:ext uri="{28A0092B-C50C-407E-A947-70E740481C1C}">
+                <a14:useLocalDpi xmlns:a14="http://schemas.microsoft.com/office/drawing/2010/main" val="0"/>
+              </a:ext>
+            </a:extLst>
+          </a:blip>
+          <a:srcRect/>
+          <a:stretch>
+            <a:fillRect/>
+          </a:stretch>
+        </p:blipFill>
+        <p:spPr bwMode="auto">
+          <a:xfrm>
+            <a:off x="3429000" y="1504949"/>
+            <a:ext cx="5076825" cy="4871823"/>
+          </a:xfrm>
+          <a:prstGeom prst="rect">
+            <a:avLst/>
+          </a:prstGeom>
+          <a:noFill/>
+          <a:extLst>
+            <a:ext uri="{909E8E84-426E-40DD-AFC4-6F175D3DCCD1}">
+              <a14:hiddenFill xmlns:a14="http://schemas.microsoft.com/office/drawing/2010/main">
+                <a:solidFill>
+                  <a:srgbClr val="FFFFFF"/>
+                </a:solidFill>
+              </a14:hiddenFill>
+            </a:ext>
+          </a:extLst>
+        </p:spPr>
+      </p:pic>
+      <p:sp>
+        <p:nvSpPr>
+          <p:cNvPr id="5" name="TextBox 4"/>
+          <p:cNvSpPr txBox="1"/>
+          <p:nvPr/>
+        </p:nvSpPr>
+        <p:spPr>
+          <a:xfrm>
+            <a:off x="381000" y="1504949"/>
+            <a:ext cx="2514600" cy="1077218"/>
+          </a:xfrm>
+          <a:prstGeom prst="rect">
+            <a:avLst/>
+          </a:prstGeom>
+          <a:noFill/>
+        </p:spPr>
+        <p:txBody>
+          <a:bodyPr wrap="square" rtlCol="0">
+            <a:spAutoFit/>
+          </a:bodyPr>
+          <a:lstStyle/>
+          <a:p>
+            <a:r>
+              <a:rPr lang="en-US" sz="3200" dirty="0" smtClean="0"/>
+              <a:t>Gospels: 6.2%</a:t>
+            </a:r>
+          </a:p>
+          <a:p>
+            <a:r>
+              <a:rPr lang="en-US" sz="3200" dirty="0" smtClean="0"/>
+              <a:t>Other: 11%</a:t>
+            </a:r>
+            <a:endParaRPr lang="en-US" sz="3200" dirty="0"/>
+          </a:p>
+        </p:txBody>
+      </p:sp>
     </p:spTree>
     <p:extLst>
       <p:ext uri="{BB962C8B-B14F-4D97-AF65-F5344CB8AC3E}">
@@ -6824,10 +6938,136 @@
           <a:chExt cx="0" cy="0"/>
         </a:xfrm>
       </p:grpSpPr>
+      <p:pic>
+        <p:nvPicPr>
+          <p:cNvPr id="2050" name="Picture 2" descr="C:\Users\bgorman\AppData\Local\Skitch\Screenshot_112015_100611_PM.jpg"/>
+          <p:cNvPicPr>
+            <a:picLocks noChangeAspect="1" noChangeArrowheads="1"/>
+          </p:cNvPicPr>
+          <p:nvPr/>
+        </p:nvPicPr>
+        <p:blipFill>
+          <a:blip r:embed="rId2">
+            <a:extLst>
+              <a:ext uri="{28A0092B-C50C-407E-A947-70E740481C1C}">
+                <a14:useLocalDpi xmlns:a14="http://schemas.microsoft.com/office/drawing/2010/main" val="0"/>
+              </a:ext>
+            </a:extLst>
+          </a:blip>
+          <a:srcRect/>
+          <a:stretch>
+            <a:fillRect/>
+          </a:stretch>
+        </p:blipFill>
+        <p:spPr bwMode="auto">
+          <a:xfrm>
+            <a:off x="3534858" y="1143000"/>
+            <a:ext cx="5157788" cy="4872001"/>
+          </a:xfrm>
+          <a:prstGeom prst="rect">
+            <a:avLst/>
+          </a:prstGeom>
+          <a:noFill/>
+          <a:extLst>
+            <a:ext uri="{909E8E84-426E-40DD-AFC4-6F175D3DCCD1}">
+              <a14:hiddenFill xmlns:a14="http://schemas.microsoft.com/office/drawing/2010/main">
+                <a:solidFill>
+                  <a:srgbClr val="FFFFFF"/>
+                </a:solidFill>
+              </a14:hiddenFill>
+            </a:ext>
+          </a:extLst>
+        </p:spPr>
+      </p:pic>
+      <p:sp>
+        <p:nvSpPr>
+          <p:cNvPr id="2" name="Rectangle 1"/>
+          <p:cNvSpPr/>
+          <p:nvPr/>
+        </p:nvSpPr>
+        <p:spPr>
+          <a:xfrm>
+            <a:off x="2699437" y="304800"/>
+            <a:ext cx="2681568" cy="584775"/>
+          </a:xfrm>
+          <a:prstGeom prst="rect">
+            <a:avLst/>
+          </a:prstGeom>
+        </p:spPr>
+        <p:txBody>
+          <a:bodyPr wrap="none">
+            <a:spAutoFit/>
+          </a:bodyPr>
+          <a:lstStyle/>
+          <a:p>
+            <a:r>
+              <a:rPr lang="en-US" dirty="0"/>
+              <a:t>#-</a:t>
+            </a:r>
+            <a:r>
+              <a:rPr lang="en-US" sz="3200" dirty="0" err="1"/>
+              <a:t>pred</a:t>
+            </a:r>
+            <a:r>
+              <a:rPr lang="en-US" sz="3200" dirty="0"/>
+              <a:t>*</a:t>
+            </a:r>
+            <a:r>
+              <a:rPr lang="en-US" sz="3200" dirty="0" err="1"/>
+              <a:t>adv</a:t>
+            </a:r>
+            <a:r>
+              <a:rPr lang="en-US" sz="3200" dirty="0"/>
+              <a:t>*</a:t>
+            </a:r>
+            <a:r>
+              <a:rPr lang="en-US" sz="3200" dirty="0" err="1"/>
+              <a:t>obl</a:t>
+            </a:r>
+            <a:endParaRPr lang="en-US" sz="3200" dirty="0"/>
+          </a:p>
+        </p:txBody>
+      </p:sp>
+      <p:sp>
+        <p:nvSpPr>
+          <p:cNvPr id="3" name="TextBox 2"/>
+          <p:cNvSpPr txBox="1"/>
+          <p:nvPr/>
+        </p:nvSpPr>
+        <p:spPr>
+          <a:xfrm>
+            <a:off x="457200" y="1143000"/>
+            <a:ext cx="2971800" cy="1077218"/>
+          </a:xfrm>
+          <a:prstGeom prst="rect">
+            <a:avLst/>
+          </a:prstGeom>
+          <a:noFill/>
+        </p:spPr>
+        <p:txBody>
+          <a:bodyPr wrap="square" rtlCol="0">
+            <a:spAutoFit/>
+          </a:bodyPr>
+          <a:lstStyle/>
+          <a:p>
+            <a:r>
+              <a:rPr lang="en-US" sz="3200" dirty="0" smtClean="0"/>
+              <a:t>Gospels: 10.2%</a:t>
+            </a:r>
+          </a:p>
+          <a:p>
+            <a:r>
+              <a:rPr lang="en-US" sz="3200" dirty="0" smtClean="0"/>
+              <a:t>Other: 22.8 </a:t>
+            </a:r>
+            <a:endParaRPr lang="en-US" sz="3200" dirty="0"/>
+          </a:p>
+        </p:txBody>
+      </p:sp>
     </p:spTree>
     <p:extLst>
       <p:ext uri="{BB962C8B-B14F-4D97-AF65-F5344CB8AC3E}">
-        <p14:creationId xmlns:p14="http://schemas.microsoft.com/office/powerpoint/2010/main" val="3651251494"/>
+        <p14:creationId xmlns:p14="http://schemas.microsoft.com/office/powerpoint/2010/main" val="4070012648"/>
       </p:ext>
     </p:extLst>
   </p:cSld>
@@ -6958,6 +7198,36 @@
     <p:extLst>
       <p:ext uri="{BB962C8B-B14F-4D97-AF65-F5344CB8AC3E}">
         <p14:creationId xmlns:p14="http://schemas.microsoft.com/office/powerpoint/2010/main" val="3976027406"/>
+      </p:ext>
+    </p:extLst>
+  </p:cSld>
+  <p:clrMapOvr>
+    <a:masterClrMapping/>
+  </p:clrMapOvr>
+</p:sld>
+</file>
+
+<file path=ppt/slides/slide40.xml><?xml version="1.0" encoding="utf-8"?>
+<p:sld xmlns:a="http://schemas.openxmlformats.org/drawingml/2006/main" xmlns:r="http://schemas.openxmlformats.org/officeDocument/2006/relationships" xmlns:p="http://schemas.openxmlformats.org/presentationml/2006/main">
+  <p:cSld>
+    <p:spTree>
+      <p:nvGrpSpPr>
+        <p:cNvPr id="1" name=""/>
+        <p:cNvGrpSpPr/>
+        <p:nvPr/>
+      </p:nvGrpSpPr>
+      <p:grpSpPr>
+        <a:xfrm>
+          <a:off x="0" y="0"/>
+          <a:ext cx="0" cy="0"/>
+          <a:chOff x="0" y="0"/>
+          <a:chExt cx="0" cy="0"/>
+        </a:xfrm>
+      </p:grpSpPr>
+    </p:spTree>
+    <p:extLst>
+      <p:ext uri="{BB962C8B-B14F-4D97-AF65-F5344CB8AC3E}">
+        <p14:creationId xmlns:p14="http://schemas.microsoft.com/office/powerpoint/2010/main" val="3651251494"/>
       </p:ext>
     </p:extLst>
   </p:cSld>

</xml_diff>